<commit_message>
Update logic class diagrams, renaming image file
</commit_message>
<xml_diff>
--- a/docs/diagrams/LogicComponentSequenceDiagram.pptx
+++ b/docs/diagrams/LogicComponentSequenceDiagram.pptx
@@ -3738,13 +3738,15 @@
       <p:cxnSp>
         <p:nvCxnSpPr>
           <p:cNvPr id="17" name="Straight Connector 16"/>
-          <p:cNvCxnSpPr/>
+          <p:cNvCxnSpPr>
+            <a:endCxn id="18" idx="2"/>
+          </p:cNvCxnSpPr>
           <p:nvPr/>
         </p:nvCxnSpPr>
         <p:spPr>
           <a:xfrm>
             <a:off x="3366216" y="2663904"/>
-            <a:ext cx="0" cy="1695374"/>
+            <a:ext cx="15456" cy="1587651"/>
           </a:xfrm>
           <a:prstGeom prst="line">
             <a:avLst/>
@@ -3910,13 +3912,14 @@
           <p:cNvPr id="20" name="Straight Connector 19"/>
           <p:cNvCxnSpPr>
             <a:stCxn id="21" idx="0"/>
+            <a:endCxn id="65" idx="2"/>
           </p:cNvCxnSpPr>
           <p:nvPr/>
         </p:nvCxnSpPr>
         <p:spPr>
-          <a:xfrm>
-            <a:off x="6782191" y="3774278"/>
-            <a:ext cx="0" cy="1940722"/>
+          <a:xfrm flipH="1">
+            <a:off x="6777730" y="3774278"/>
+            <a:ext cx="4461" cy="1712122"/>
           </a:xfrm>
           <a:prstGeom prst="line">
             <a:avLst/>
@@ -4092,39 +4095,7 @@
                   <a:srgbClr val="0070C0"/>
                 </a:solidFill>
               </a:rPr>
-              <a:t>execute</a:t>
-            </a:r>
-            <a:r>
-              <a:rPr lang="en-US" sz="1400" dirty="0" smtClean="0">
-                <a:solidFill>
-                  <a:srgbClr val="0070C0"/>
-                </a:solidFill>
-              </a:rPr>
-              <a:t>(“delete </a:t>
-            </a:r>
-            <a:r>
-              <a:rPr lang="en-US" sz="1400" dirty="0" smtClean="0">
-                <a:solidFill>
-                  <a:srgbClr val="0070C0"/>
-                </a:solidFill>
-              </a:rPr>
-              <a:t>/float </a:t>
-            </a:r>
-            <a:r>
-              <a:rPr lang="en-US" sz="1400" dirty="0" smtClean="0">
-                <a:solidFill>
-                  <a:srgbClr val="0070C0"/>
-                </a:solidFill>
-              </a:rPr>
-              <a:t>1</a:t>
-            </a:r>
-            <a:r>
-              <a:rPr lang="en-US" sz="1400" dirty="0" smtClean="0">
-                <a:solidFill>
-                  <a:srgbClr val="0070C0"/>
-                </a:solidFill>
-              </a:rPr>
-              <a:t>”)</a:t>
+              <a:t>execute(“delete /float 1”)</a:t>
             </a:r>
             <a:endParaRPr lang="en-US" sz="1400" dirty="0">
               <a:solidFill>
@@ -4780,15 +4751,7 @@
             </a:r>
             <a:r>
               <a:rPr lang="en-US" sz="1200" dirty="0" smtClean="0"/>
-              <a:t>arse</a:t>
-            </a:r>
-            <a:r>
-              <a:rPr lang="en-US" sz="1200" dirty="0" smtClean="0"/>
-              <a:t>(“/float 1</a:t>
-            </a:r>
-            <a:r>
-              <a:rPr lang="en-US" sz="1200" dirty="0" smtClean="0"/>
-              <a:t>”)</a:t>
+              <a:t>arse(“/float 1”)</a:t>
             </a:r>
             <a:endParaRPr lang="en-US" sz="1200" dirty="0"/>
           </a:p>
@@ -4829,15 +4792,7 @@
           <a:p>
             <a:r>
               <a:rPr lang="en-US" dirty="0" smtClean="0"/>
-              <a:t>parse(“delete </a:t>
-            </a:r>
-            <a:r>
-              <a:rPr lang="en-US" dirty="0" smtClean="0"/>
-              <a:t>/float 1</a:t>
-            </a:r>
-            <a:r>
-              <a:rPr lang="en-US" dirty="0" smtClean="0"/>
-              <a:t>”)</a:t>
+              <a:t>parse(“delete /float 1”)</a:t>
             </a:r>
             <a:endParaRPr lang="en-US" dirty="0"/>
           </a:p>
@@ -4982,15 +4937,7 @@
                   <a:schemeClr val="bg1"/>
                 </a:solidFill>
               </a:rPr>
-              <a:t> </a:t>
-            </a:r>
-            <a:r>
-              <a:rPr lang="en-US" sz="1600" dirty="0" smtClean="0">
-                <a:solidFill>
-                  <a:schemeClr val="bg1"/>
-                </a:solidFill>
-              </a:rPr>
-              <a:t>Result</a:t>
+              <a:t> Result</a:t>
             </a:r>
             <a:endParaRPr lang="en-SG" sz="1600" dirty="0">
               <a:solidFill>

</xml_diff>